<commit_message>
update powerpoint and visio
</commit_message>
<xml_diff>
--- a/presentation/ApacheCamel.pptx
+++ b/presentation/ApacheCamel.pptx
@@ -5,7 +5,7 @@
     <p:sldMasterId id="2147483648" r:id="rId1"/>
   </p:sldMasterIdLst>
   <p:notesMasterIdLst>
-    <p:notesMasterId r:id="rId20"/>
+    <p:notesMasterId r:id="rId21"/>
   </p:notesMasterIdLst>
   <p:sldIdLst>
     <p:sldId id="256" r:id="rId2"/>
@@ -25,7 +25,8 @@
     <p:sldId id="264" r:id="rId16"/>
     <p:sldId id="278" r:id="rId17"/>
     <p:sldId id="267" r:id="rId18"/>
-    <p:sldId id="272" r:id="rId19"/>
+    <p:sldId id="280" r:id="rId19"/>
+    <p:sldId id="272" r:id="rId20"/>
   </p:sldIdLst>
   <p:sldSz cx="12192000" cy="6858000"/>
   <p:notesSz cx="6858000" cy="9144000"/>
@@ -214,7 +215,7 @@
           <a:p>
             <a:fld id="{9F750727-92B0-8045-9855-3A6FFC1FE122}" type="datetimeFigureOut">
               <a:rPr lang="en-US" smtClean="0"/>
-              <a:t>2/28/2019</a:t>
+              <a:t>3/4/2019</a:t>
             </a:fld>
             <a:endParaRPr lang="en-US"/>
           </a:p>
@@ -1062,6 +1063,90 @@
 </p:notes>
 </file>
 
+<file path=ppt/notesSlides/notesSlide7.xml><?xml version="1.0" encoding="utf-8"?>
+<p:notes xmlns:a="http://schemas.openxmlformats.org/drawingml/2006/main" xmlns:r="http://schemas.openxmlformats.org/officeDocument/2006/relationships" xmlns:p="http://schemas.openxmlformats.org/presentationml/2006/main">
+  <p:cSld>
+    <p:spTree>
+      <p:nvGrpSpPr>
+        <p:cNvPr id="1" name=""/>
+        <p:cNvGrpSpPr/>
+        <p:nvPr/>
+      </p:nvGrpSpPr>
+      <p:grpSpPr>
+        <a:xfrm>
+          <a:off x="0" y="0"/>
+          <a:ext cx="0" cy="0"/>
+          <a:chOff x="0" y="0"/>
+          <a:chExt cx="0" cy="0"/>
+        </a:xfrm>
+      </p:grpSpPr>
+      <p:sp>
+        <p:nvSpPr>
+          <p:cNvPr id="2" name="Slide Image Placeholder 1"/>
+          <p:cNvSpPr>
+            <a:spLocks noGrp="1" noRot="1" noChangeAspect="1"/>
+          </p:cNvSpPr>
+          <p:nvPr>
+            <p:ph type="sldImg"/>
+          </p:nvPr>
+        </p:nvSpPr>
+        <p:spPr/>
+      </p:sp>
+      <p:sp>
+        <p:nvSpPr>
+          <p:cNvPr id="3" name="Notes Placeholder 2"/>
+          <p:cNvSpPr>
+            <a:spLocks noGrp="1"/>
+          </p:cNvSpPr>
+          <p:nvPr>
+            <p:ph type="body" idx="1"/>
+          </p:nvPr>
+        </p:nvSpPr>
+        <p:spPr/>
+        <p:txBody>
+          <a:bodyPr/>
+          <a:lstStyle/>
+          <a:p>
+            <a:endParaRPr lang="en-AU" dirty="0"/>
+          </a:p>
+        </p:txBody>
+      </p:sp>
+      <p:sp>
+        <p:nvSpPr>
+          <p:cNvPr id="4" name="Slide Number Placeholder 3"/>
+          <p:cNvSpPr>
+            <a:spLocks noGrp="1"/>
+          </p:cNvSpPr>
+          <p:nvPr>
+            <p:ph type="sldNum" sz="quarter" idx="5"/>
+          </p:nvPr>
+        </p:nvSpPr>
+        <p:spPr/>
+        <p:txBody>
+          <a:bodyPr/>
+          <a:lstStyle/>
+          <a:p>
+            <a:fld id="{E965BAF6-7E9C-7E43-B884-0DA1A318AC7A}" type="slidenum">
+              <a:rPr lang="en-US" smtClean="0"/>
+              <a:t>18</a:t>
+            </a:fld>
+            <a:endParaRPr lang="en-US"/>
+          </a:p>
+        </p:txBody>
+      </p:sp>
+    </p:spTree>
+    <p:extLst>
+      <p:ext uri="{BB962C8B-B14F-4D97-AF65-F5344CB8AC3E}">
+        <p14:creationId xmlns:p14="http://schemas.microsoft.com/office/powerpoint/2010/main" val="2403465999"/>
+      </p:ext>
+    </p:extLst>
+  </p:cSld>
+  <p:clrMapOvr>
+    <a:masterClrMapping/>
+  </p:clrMapOvr>
+</p:notes>
+</file>
+
 <file path=ppt/slideLayouts/slideLayout1.xml><?xml version="1.0" encoding="utf-8"?>
 <p:sldLayout xmlns:a="http://schemas.openxmlformats.org/drawingml/2006/main" xmlns:r="http://schemas.openxmlformats.org/officeDocument/2006/relationships" xmlns:p="http://schemas.openxmlformats.org/presentationml/2006/main" type="title" preserve="1">
   <p:cSld name="Title Slide">
@@ -1251,7 +1336,7 @@
             <a:fld id="{B61BEF0D-F0BB-DE4B-95CE-6DB70DBA9567}" type="datetimeFigureOut">
               <a:rPr lang="en-US" dirty="0"/>
               <a:pPr/>
-              <a:t>2/28/2019</a:t>
+              <a:t>3/4/2019</a:t>
             </a:fld>
             <a:endParaRPr lang="en-US" dirty="0"/>
           </a:p>
@@ -1586,7 +1671,7 @@
             <a:fld id="{B61BEF0D-F0BB-DE4B-95CE-6DB70DBA9567}" type="datetimeFigureOut">
               <a:rPr lang="en-US" dirty="0"/>
               <a:pPr/>
-              <a:t>2/28/2019</a:t>
+              <a:t>3/4/2019</a:t>
             </a:fld>
             <a:endParaRPr lang="en-US" dirty="0"/>
           </a:p>
@@ -1984,7 +2069,7 @@
             <a:fld id="{B61BEF0D-F0BB-DE4B-95CE-6DB70DBA9567}" type="datetimeFigureOut">
               <a:rPr lang="en-US" dirty="0"/>
               <a:pPr/>
-              <a:t>2/28/2019</a:t>
+              <a:t>3/4/2019</a:t>
             </a:fld>
             <a:endParaRPr lang="en-US" dirty="0"/>
           </a:p>
@@ -2317,7 +2402,7 @@
             <a:fld id="{B61BEF0D-F0BB-DE4B-95CE-6DB70DBA9567}" type="datetimeFigureOut">
               <a:rPr lang="en-US" dirty="0"/>
               <a:pPr/>
-              <a:t>2/28/2019</a:t>
+              <a:t>3/4/2019</a:t>
             </a:fld>
             <a:endParaRPr lang="en-US" dirty="0"/>
           </a:p>
@@ -2634,7 +2719,7 @@
             <a:fld id="{B61BEF0D-F0BB-DE4B-95CE-6DB70DBA9567}" type="datetimeFigureOut">
               <a:rPr lang="en-US" dirty="0"/>
               <a:pPr/>
-              <a:t>2/28/2019</a:t>
+              <a:t>3/4/2019</a:t>
             </a:fld>
             <a:endParaRPr lang="en-US" dirty="0"/>
           </a:p>
@@ -3027,7 +3112,7 @@
             <a:fld id="{B61BEF0D-F0BB-DE4B-95CE-6DB70DBA9567}" type="datetimeFigureOut">
               <a:rPr lang="en-US" dirty="0"/>
               <a:pPr/>
-              <a:t>2/28/2019</a:t>
+              <a:t>3/4/2019</a:t>
             </a:fld>
             <a:endParaRPr lang="en-US" dirty="0"/>
           </a:p>
@@ -3281,7 +3366,7 @@
             <a:fld id="{B61BEF0D-F0BB-DE4B-95CE-6DB70DBA9567}" type="datetimeFigureOut">
               <a:rPr lang="en-US" dirty="0"/>
               <a:pPr/>
-              <a:t>2/28/2019</a:t>
+              <a:t>3/4/2019</a:t>
             </a:fld>
             <a:endParaRPr lang="en-US" dirty="0"/>
           </a:p>
@@ -3540,7 +3625,7 @@
             <a:fld id="{B61BEF0D-F0BB-DE4B-95CE-6DB70DBA9567}" type="datetimeFigureOut">
               <a:rPr lang="en-US" dirty="0"/>
               <a:pPr/>
-              <a:t>2/28/2019</a:t>
+              <a:t>3/4/2019</a:t>
             </a:fld>
             <a:endParaRPr lang="en-US" dirty="0"/>
           </a:p>
@@ -3799,7 +3884,7 @@
             <a:fld id="{B61BEF0D-F0BB-DE4B-95CE-6DB70DBA9567}" type="datetimeFigureOut">
               <a:rPr lang="en-US" dirty="0"/>
               <a:pPr/>
-              <a:t>2/28/2019</a:t>
+              <a:t>3/4/2019</a:t>
             </a:fld>
             <a:endParaRPr lang="en-US" dirty="0"/>
           </a:p>
@@ -4125,7 +4210,7 @@
             <a:fld id="{B61BEF0D-F0BB-DE4B-95CE-6DB70DBA9567}" type="datetimeFigureOut">
               <a:rPr lang="en-US" dirty="0"/>
               <a:pPr/>
-              <a:t>2/28/2019</a:t>
+              <a:t>3/4/2019</a:t>
             </a:fld>
             <a:endParaRPr lang="en-US" dirty="0"/>
           </a:p>
@@ -4445,7 +4530,7 @@
             <a:fld id="{B61BEF0D-F0BB-DE4B-95CE-6DB70DBA9567}" type="datetimeFigureOut">
               <a:rPr lang="en-US" dirty="0"/>
               <a:pPr/>
-              <a:t>2/28/2019</a:t>
+              <a:t>3/4/2019</a:t>
             </a:fld>
             <a:endParaRPr lang="en-US" dirty="0"/>
           </a:p>
@@ -4899,7 +4984,7 @@
             <a:fld id="{B61BEF0D-F0BB-DE4B-95CE-6DB70DBA9567}" type="datetimeFigureOut">
               <a:rPr lang="en-US" dirty="0"/>
               <a:pPr/>
-              <a:t>2/28/2019</a:t>
+              <a:t>3/4/2019</a:t>
             </a:fld>
             <a:endParaRPr lang="en-US" dirty="0"/>
           </a:p>
@@ -5101,7 +5186,7 @@
             <a:fld id="{B61BEF0D-F0BB-DE4B-95CE-6DB70DBA9567}" type="datetimeFigureOut">
               <a:rPr lang="en-US" dirty="0"/>
               <a:pPr/>
-              <a:t>2/28/2019</a:t>
+              <a:t>3/4/2019</a:t>
             </a:fld>
             <a:endParaRPr lang="en-US" dirty="0"/>
           </a:p>
@@ -5275,7 +5360,7 @@
             <a:fld id="{B61BEF0D-F0BB-DE4B-95CE-6DB70DBA9567}" type="datetimeFigureOut">
               <a:rPr lang="en-US" dirty="0"/>
               <a:pPr/>
-              <a:t>2/28/2019</a:t>
+              <a:t>3/4/2019</a:t>
             </a:fld>
             <a:endParaRPr lang="en-US" dirty="0"/>
           </a:p>
@@ -5605,7 +5690,7 @@
             <a:fld id="{B61BEF0D-F0BB-DE4B-95CE-6DB70DBA9567}" type="datetimeFigureOut">
               <a:rPr lang="en-US" dirty="0"/>
               <a:pPr/>
-              <a:t>2/28/2019</a:t>
+              <a:t>3/4/2019</a:t>
             </a:fld>
             <a:endParaRPr lang="en-US" dirty="0"/>
           </a:p>
@@ -5947,7 +6032,7 @@
             <a:fld id="{B61BEF0D-F0BB-DE4B-95CE-6DB70DBA9567}" type="datetimeFigureOut">
               <a:rPr lang="en-US" dirty="0"/>
               <a:pPr/>
-              <a:t>2/28/2019</a:t>
+              <a:t>3/4/2019</a:t>
             </a:fld>
             <a:endParaRPr lang="en-US" dirty="0"/>
           </a:p>
@@ -8061,7 +8146,7 @@
             <a:fld id="{B61BEF0D-F0BB-DE4B-95CE-6DB70DBA9567}" type="datetimeFigureOut">
               <a:rPr lang="en-US" dirty="0"/>
               <a:pPr/>
-              <a:t>2/28/2019</a:t>
+              <a:t>3/4/2019</a:t>
             </a:fld>
             <a:endParaRPr lang="en-US" dirty="0"/>
           </a:p>
@@ -8782,7 +8867,7 @@
         </p:blipFill>
         <p:spPr>
           <a:xfrm>
-            <a:off x="1226428" y="1480221"/>
+            <a:off x="2372276" y="1977665"/>
             <a:ext cx="5647337" cy="994888"/>
           </a:xfrm>
           <a:prstGeom prst="rect">
@@ -8809,7 +8894,7 @@
         </p:nvSpPr>
         <p:spPr>
           <a:xfrm>
-            <a:off x="2372276" y="2816851"/>
+            <a:off x="2372276" y="3701929"/>
             <a:ext cx="3469125" cy="2181364"/>
           </a:xfrm>
           <a:prstGeom prst="rect">
@@ -8820,7 +8905,7 @@
           </a:ln>
           <a:extLst>
             <a:ext uri="{C572A759-6A51-4108-AA02-DFA0A04FC94B}">
-              <ma14:wrappingTextBoxFlag xmlns:lc="http://schemas.openxmlformats.org/drawingml/2006/lockedCanvas" xmlns:ma14="http://schemas.microsoft.com/office/mac/drawingml/2011/main" xmlns:a14="http://schemas.microsoft.com/office/drawing/2010/main" xmlns:m="http://schemas.openxmlformats.org/officeDocument/2006/math" xmlns="" val="1"/>
+              <ma14:wrappingTextBoxFlag xmlns="" xmlns:m="http://schemas.openxmlformats.org/officeDocument/2006/math" xmlns:a14="http://schemas.microsoft.com/office/drawing/2010/main" xmlns:ma14="http://schemas.microsoft.com/office/mac/drawingml/2011/main" xmlns:lc="http://schemas.openxmlformats.org/drawingml/2006/lockedCanvas" val="1"/>
             </a:ext>
           </a:extLst>
         </p:spPr>
@@ -9206,8 +9291,8 @@
         </p:blipFill>
         <p:spPr>
           <a:xfrm>
-            <a:off x="6217921" y="1493980"/>
-            <a:ext cx="5540420" cy="3648175"/>
+            <a:off x="6217921" y="1493981"/>
+            <a:ext cx="5378334" cy="3005284"/>
           </a:xfrm>
           <a:prstGeom prst="rect">
             <a:avLst/>
@@ -9241,8 +9326,8 @@
         </p:blipFill>
         <p:spPr>
           <a:xfrm>
-            <a:off x="1289908" y="1481509"/>
-            <a:ext cx="4250281" cy="3660645"/>
+            <a:off x="1289909" y="1481510"/>
+            <a:ext cx="4040628" cy="3105978"/>
           </a:xfrm>
           <a:prstGeom prst="rect">
             <a:avLst/>
@@ -9412,7 +9497,7 @@
           </a:ln>
           <a:extLst>
             <a:ext uri="{C572A759-6A51-4108-AA02-DFA0A04FC94B}">
-              <ma14:wrappingTextBoxFlag xmlns:lc="http://schemas.openxmlformats.org/drawingml/2006/lockedCanvas" xmlns:ma14="http://schemas.microsoft.com/office/mac/drawingml/2011/main" xmlns:a14="http://schemas.microsoft.com/office/drawing/2010/main" xmlns:m="http://schemas.openxmlformats.org/officeDocument/2006/math" xmlns="" val="1"/>
+              <ma14:wrappingTextBoxFlag xmlns="" xmlns:m="http://schemas.openxmlformats.org/officeDocument/2006/math" xmlns:a14="http://schemas.microsoft.com/office/drawing/2010/main" xmlns:ma14="http://schemas.microsoft.com/office/mac/drawingml/2011/main" xmlns:lc="http://schemas.openxmlformats.org/drawingml/2006/lockedCanvas" val="1"/>
             </a:ext>
           </a:extLst>
         </p:spPr>
@@ -9803,7 +9888,7 @@
           </a:ln>
           <a:extLst>
             <a:ext uri="{C572A759-6A51-4108-AA02-DFA0A04FC94B}">
-              <ma14:wrappingTextBoxFlag xmlns:lc="http://schemas.openxmlformats.org/drawingml/2006/lockedCanvas" xmlns:ma14="http://schemas.microsoft.com/office/mac/drawingml/2011/main" xmlns:a14="http://schemas.microsoft.com/office/drawing/2010/main" xmlns:m="http://schemas.openxmlformats.org/officeDocument/2006/math" xmlns="" val="1"/>
+              <ma14:wrappingTextBoxFlag xmlns="" xmlns:m="http://schemas.openxmlformats.org/officeDocument/2006/math" xmlns:a14="http://schemas.microsoft.com/office/drawing/2010/main" xmlns:ma14="http://schemas.microsoft.com/office/mac/drawingml/2011/main" xmlns:lc="http://schemas.openxmlformats.org/drawingml/2006/lockedCanvas" val="1"/>
             </a:ext>
           </a:extLst>
         </p:spPr>
@@ -10386,10 +10471,10 @@
       </p:sp>
       <p:pic>
         <p:nvPicPr>
-          <p:cNvPr id="7" name="Picture 6">
+          <p:cNvPr id="4" name="Picture 3">
             <a:extLst>
               <a:ext uri="{FF2B5EF4-FFF2-40B4-BE49-F238E27FC236}">
-                <a16:creationId xmlns:a16="http://schemas.microsoft.com/office/drawing/2014/main" id="{2ECD9359-90E3-4387-AF3D-6309FB394BF0}"/>
+                <a16:creationId xmlns:a16="http://schemas.microsoft.com/office/drawing/2014/main" id="{C2C129E6-0042-4D19-A0ED-A3B85E31AC32}"/>
               </a:ext>
             </a:extLst>
           </p:cNvPr>
@@ -10406,7 +10491,7 @@
         </p:blipFill>
         <p:spPr>
           <a:xfrm>
-            <a:off x="3146804" y="1725750"/>
+            <a:off x="3146804" y="1359990"/>
             <a:ext cx="5898391" cy="4138019"/>
           </a:xfrm>
           <a:prstGeom prst="rect">
@@ -10547,10 +10632,10 @@
       </p:sp>
       <p:pic>
         <p:nvPicPr>
-          <p:cNvPr id="6" name="Picture 5">
+          <p:cNvPr id="4" name="Picture 3">
             <a:extLst>
               <a:ext uri="{FF2B5EF4-FFF2-40B4-BE49-F238E27FC236}">
-                <a16:creationId xmlns:a16="http://schemas.microsoft.com/office/drawing/2014/main" id="{DD7503CB-3208-4E5B-868F-31F53DDE9D45}"/>
+                <a16:creationId xmlns:a16="http://schemas.microsoft.com/office/drawing/2014/main" id="{B8400A99-5388-4E51-BAA0-55E4A2DC493D}"/>
               </a:ext>
             </a:extLst>
           </p:cNvPr>
@@ -10567,8 +10652,8 @@
         </p:blipFill>
         <p:spPr>
           <a:xfrm>
-            <a:off x="2205318" y="1032733"/>
-            <a:ext cx="8767904" cy="4295699"/>
+            <a:off x="2947594" y="1114097"/>
+            <a:ext cx="8025627" cy="4214335"/>
           </a:xfrm>
           <a:prstGeom prst="rect">
             <a:avLst/>
@@ -10780,24 +10865,161 @@
             <p:ph type="title"/>
           </p:nvPr>
         </p:nvSpPr>
-        <p:spPr/>
+        <p:spPr>
+          <a:xfrm>
+            <a:off x="1990253" y="277089"/>
+            <a:ext cx="8911687" cy="813955"/>
+          </a:xfrm>
+        </p:spPr>
         <p:txBody>
           <a:bodyPr/>
           <a:lstStyle/>
           <a:p>
             <a:r>
               <a:rPr lang="en-US" dirty="0"/>
-              <a:t>Customer Details &amp; Item Details</a:t>
-            </a:r>
+              <a:t>Routing Architecture</a:t>
+            </a:r>
+          </a:p>
+        </p:txBody>
+      </p:sp>
+      <p:sp>
+        <p:nvSpPr>
+          <p:cNvPr id="12" name="Content Placeholder 3">
+            <a:extLst>
+              <a:ext uri="{FF2B5EF4-FFF2-40B4-BE49-F238E27FC236}">
+                <a16:creationId xmlns:a16="http://schemas.microsoft.com/office/drawing/2014/main" id="{18D64E8E-5EA1-4EF5-988D-5C9E278E3D7C}"/>
+              </a:ext>
+            </a:extLst>
+          </p:cNvPr>
+          <p:cNvSpPr>
+            <a:spLocks noGrp="1"/>
+          </p:cNvSpPr>
+          <p:nvPr>
+            <p:ph idx="1"/>
+          </p:nvPr>
+        </p:nvSpPr>
+        <p:spPr>
+          <a:xfrm>
+            <a:off x="7570438" y="2286530"/>
+            <a:ext cx="4301837" cy="4324574"/>
+          </a:xfrm>
+        </p:spPr>
+        <p:txBody>
+          <a:bodyPr>
+            <a:normAutofit fontScale="92500"/>
+          </a:bodyPr>
+          <a:lstStyle/>
+          <a:p>
+            <a:pPr lvl="1"/>
+            <a:r>
+              <a:rPr lang="en-AU" dirty="0"/>
+              <a:t>Third Party Customer Details Info API</a:t>
+            </a:r>
+          </a:p>
+          <a:p>
+            <a:pPr lvl="2"/>
+            <a:r>
+              <a:rPr lang="en-AU" dirty="0"/>
+              <a:t>DSLs used to integrate Http Component</a:t>
+            </a:r>
+          </a:p>
+          <a:p>
+            <a:pPr lvl="2"/>
+            <a:r>
+              <a:rPr lang="en-AU" dirty="0"/>
+              <a:t>Exception Handling – Global/Processor Level</a:t>
+            </a:r>
+          </a:p>
+          <a:p>
+            <a:pPr lvl="1"/>
+            <a:r>
+              <a:rPr lang="en-AU" dirty="0"/>
+              <a:t>Local Item Details Services</a:t>
+            </a:r>
+          </a:p>
+          <a:p>
+            <a:pPr lvl="2"/>
+            <a:r>
+              <a:rPr lang="en-AU" dirty="0"/>
+              <a:t>Service Activator EIP – bean DSL</a:t>
+            </a:r>
+          </a:p>
+          <a:p>
+            <a:pPr lvl="2"/>
+            <a:r>
+              <a:rPr lang="en-AU" dirty="0"/>
+              <a:t>Splitter</a:t>
+            </a:r>
+          </a:p>
+          <a:p>
+            <a:pPr lvl="2"/>
+            <a:r>
+              <a:rPr lang="en-AU" dirty="0"/>
+              <a:t>Aggregator – Immediate/Threaded</a:t>
+            </a:r>
+          </a:p>
+          <a:p>
+            <a:pPr lvl="2"/>
+            <a:r>
+              <a:rPr lang="en-AU" dirty="0"/>
+              <a:t>Multicast and </a:t>
+            </a:r>
+            <a:r>
+              <a:rPr lang="en-AU" dirty="0" err="1"/>
+              <a:t>ParallelProcessing</a:t>
+            </a:r>
+            <a:r>
+              <a:rPr lang="en-AU" dirty="0"/>
+              <a:t> DSL</a:t>
+            </a:r>
+          </a:p>
+          <a:p>
+            <a:pPr lvl="2"/>
+            <a:r>
+              <a:rPr lang="en-AU" dirty="0"/>
+              <a:t>Enrich DSL</a:t>
+            </a:r>
+          </a:p>
+          <a:p>
+            <a:pPr lvl="1"/>
+            <a:r>
+              <a:rPr lang="en-AU" dirty="0"/>
+              <a:t>Event Processor </a:t>
+            </a:r>
+          </a:p>
+          <a:p>
+            <a:pPr lvl="2"/>
+            <a:r>
+              <a:rPr lang="en-AU" dirty="0"/>
+              <a:t>How to write your own Component</a:t>
+            </a:r>
+          </a:p>
+          <a:p>
+            <a:pPr lvl="1"/>
+            <a:endParaRPr lang="en-AU" dirty="0"/>
+          </a:p>
+          <a:p>
+            <a:pPr lvl="1"/>
+            <a:endParaRPr lang="en-AU" dirty="0"/>
+          </a:p>
+          <a:p>
+            <a:pPr marL="457200" lvl="1" indent="0">
+              <a:buNone/>
+            </a:pPr>
+            <a:endParaRPr lang="en-AU" dirty="0"/>
+          </a:p>
+          <a:p>
+            <a:pPr lvl="1"/>
+            <a:endParaRPr lang="en-AU" dirty="0"/>
           </a:p>
         </p:txBody>
       </p:sp>
       <p:pic>
         <p:nvPicPr>
-          <p:cNvPr id="6" name="Picture 5">
+          <p:cNvPr id="4" name="Picture 3">
             <a:extLst>
               <a:ext uri="{FF2B5EF4-FFF2-40B4-BE49-F238E27FC236}">
-                <a16:creationId xmlns:a16="http://schemas.microsoft.com/office/drawing/2014/main" id="{649B96EC-8CFB-41FA-B8C1-C3714BF29147}"/>
+                <a16:creationId xmlns:a16="http://schemas.microsoft.com/office/drawing/2014/main" id="{87699416-2A7E-417A-9275-A71C22632126}"/>
               </a:ext>
             </a:extLst>
           </p:cNvPr>
@@ -10814,8 +11036,8 @@
         </p:blipFill>
         <p:spPr>
           <a:xfrm>
-            <a:off x="2059054" y="1905000"/>
-            <a:ext cx="8375106" cy="4145639"/>
+            <a:off x="584583" y="1484555"/>
+            <a:ext cx="7139408" cy="5013092"/>
           </a:xfrm>
           <a:prstGeom prst="rect">
             <a:avLst/>
@@ -10836,6 +11058,69 @@
 </file>
 
 <file path=ppt/slides/slide18.xml><?xml version="1.0" encoding="utf-8"?>
+<p:sld xmlns:a="http://schemas.openxmlformats.org/drawingml/2006/main" xmlns:r="http://schemas.openxmlformats.org/officeDocument/2006/relationships" xmlns:p="http://schemas.openxmlformats.org/presentationml/2006/main">
+  <p:cSld>
+    <p:spTree>
+      <p:nvGrpSpPr>
+        <p:cNvPr id="1" name=""/>
+        <p:cNvGrpSpPr/>
+        <p:nvPr/>
+      </p:nvGrpSpPr>
+      <p:grpSpPr>
+        <a:xfrm>
+          <a:off x="0" y="0"/>
+          <a:ext cx="0" cy="0"/>
+          <a:chOff x="0" y="0"/>
+          <a:chExt cx="0" cy="0"/>
+        </a:xfrm>
+      </p:grpSpPr>
+      <p:sp>
+        <p:nvSpPr>
+          <p:cNvPr id="2" name="Title 1">
+            <a:extLst>
+              <a:ext uri="{FF2B5EF4-FFF2-40B4-BE49-F238E27FC236}">
+                <a16:creationId xmlns:a16="http://schemas.microsoft.com/office/drawing/2014/main" id="{AD6090EC-A95C-4D4B-A7FB-293C55976D65}"/>
+              </a:ext>
+            </a:extLst>
+          </p:cNvPr>
+          <p:cNvSpPr>
+            <a:spLocks noGrp="1"/>
+          </p:cNvSpPr>
+          <p:nvPr>
+            <p:ph type="title"/>
+          </p:nvPr>
+        </p:nvSpPr>
+        <p:spPr>
+          <a:xfrm>
+            <a:off x="1990253" y="277089"/>
+            <a:ext cx="8911687" cy="813955"/>
+          </a:xfrm>
+        </p:spPr>
+        <p:txBody>
+          <a:bodyPr/>
+          <a:lstStyle/>
+          <a:p>
+            <a:r>
+              <a:rPr lang="en-US" dirty="0"/>
+              <a:t>Project Layout</a:t>
+            </a:r>
+          </a:p>
+        </p:txBody>
+      </p:sp>
+    </p:spTree>
+    <p:extLst>
+      <p:ext uri="{BB962C8B-B14F-4D97-AF65-F5344CB8AC3E}">
+        <p14:creationId xmlns:p14="http://schemas.microsoft.com/office/powerpoint/2010/main" val="1228963046"/>
+      </p:ext>
+    </p:extLst>
+  </p:cSld>
+  <p:clrMapOvr>
+    <a:masterClrMapping/>
+  </p:clrMapOvr>
+</p:sld>
+</file>
+
+<file path=ppt/slides/slide19.xml><?xml version="1.0" encoding="utf-8"?>
 <p:sld xmlns:a="http://schemas.openxmlformats.org/drawingml/2006/main" xmlns:r="http://schemas.openxmlformats.org/officeDocument/2006/relationships" xmlns:p="http://schemas.openxmlformats.org/presentationml/2006/main">
   <p:cSld>
     <p:spTree>

</xml_diff>

<commit_message>
Powerpoint and images update
</commit_message>
<xml_diff>
--- a/presentation/ApacheCamel.pptx
+++ b/presentation/ApacheCamel.pptx
@@ -5,7 +5,7 @@
     <p:sldMasterId id="2147483648" r:id="rId1"/>
   </p:sldMasterIdLst>
   <p:notesMasterIdLst>
-    <p:notesMasterId r:id="rId21"/>
+    <p:notesMasterId r:id="rId20"/>
   </p:notesMasterIdLst>
   <p:sldIdLst>
     <p:sldId id="256" r:id="rId2"/>
@@ -26,7 +26,6 @@
     <p:sldId id="278" r:id="rId17"/>
     <p:sldId id="267" r:id="rId18"/>
     <p:sldId id="280" r:id="rId19"/>
-    <p:sldId id="272" r:id="rId20"/>
   </p:sldIdLst>
   <p:sldSz cx="12192000" cy="6858000"/>
   <p:notesSz cx="6858000" cy="9144000"/>
@@ -8905,7 +8904,7 @@
           </a:ln>
           <a:extLst>
             <a:ext uri="{C572A759-6A51-4108-AA02-DFA0A04FC94B}">
-              <ma14:wrappingTextBoxFlag xmlns="" xmlns:m="http://schemas.openxmlformats.org/officeDocument/2006/math" xmlns:a14="http://schemas.microsoft.com/office/drawing/2010/main" xmlns:ma14="http://schemas.microsoft.com/office/mac/drawingml/2011/main" xmlns:lc="http://schemas.openxmlformats.org/drawingml/2006/lockedCanvas" val="1"/>
+              <ma14:wrappingTextBoxFlag xmlns:lc="http://schemas.openxmlformats.org/drawingml/2006/lockedCanvas" xmlns:ma14="http://schemas.microsoft.com/office/mac/drawingml/2011/main" xmlns:a14="http://schemas.microsoft.com/office/drawing/2010/main" xmlns:m="http://schemas.openxmlformats.org/officeDocument/2006/math" xmlns="" val="1"/>
             </a:ext>
           </a:extLst>
         </p:spPr>
@@ -9497,7 +9496,7 @@
           </a:ln>
           <a:extLst>
             <a:ext uri="{C572A759-6A51-4108-AA02-DFA0A04FC94B}">
-              <ma14:wrappingTextBoxFlag xmlns="" xmlns:m="http://schemas.openxmlformats.org/officeDocument/2006/math" xmlns:a14="http://schemas.microsoft.com/office/drawing/2010/main" xmlns:ma14="http://schemas.microsoft.com/office/mac/drawingml/2011/main" xmlns:lc="http://schemas.openxmlformats.org/drawingml/2006/lockedCanvas" val="1"/>
+              <ma14:wrappingTextBoxFlag xmlns:lc="http://schemas.openxmlformats.org/drawingml/2006/lockedCanvas" xmlns:ma14="http://schemas.microsoft.com/office/mac/drawingml/2011/main" xmlns:a14="http://schemas.microsoft.com/office/drawing/2010/main" xmlns:m="http://schemas.openxmlformats.org/officeDocument/2006/math" xmlns="" val="1"/>
             </a:ext>
           </a:extLst>
         </p:spPr>
@@ -9888,7 +9887,7 @@
           </a:ln>
           <a:extLst>
             <a:ext uri="{C572A759-6A51-4108-AA02-DFA0A04FC94B}">
-              <ma14:wrappingTextBoxFlag xmlns="" xmlns:m="http://schemas.openxmlformats.org/officeDocument/2006/math" xmlns:a14="http://schemas.microsoft.com/office/drawing/2010/main" xmlns:ma14="http://schemas.microsoft.com/office/mac/drawingml/2011/main" xmlns:lc="http://schemas.openxmlformats.org/drawingml/2006/lockedCanvas" val="1"/>
+              <ma14:wrappingTextBoxFlag xmlns:lc="http://schemas.openxmlformats.org/drawingml/2006/lockedCanvas" xmlns:ma14="http://schemas.microsoft.com/office/mac/drawingml/2011/main" xmlns:a14="http://schemas.microsoft.com/office/drawing/2010/main" xmlns:m="http://schemas.openxmlformats.org/officeDocument/2006/math" xmlns="" val="1"/>
             </a:ext>
           </a:extLst>
         </p:spPr>
@@ -11107,438 +11106,40 @@
           </a:p>
         </p:txBody>
       </p:sp>
+      <p:pic>
+        <p:nvPicPr>
+          <p:cNvPr id="3" name="Picture 2">
+            <a:extLst>
+              <a:ext uri="{FF2B5EF4-FFF2-40B4-BE49-F238E27FC236}">
+                <a16:creationId xmlns:a16="http://schemas.microsoft.com/office/drawing/2014/main" id="{7396B889-35E8-4F68-B98E-77BD405C2707}"/>
+              </a:ext>
+            </a:extLst>
+          </p:cNvPr>
+          <p:cNvPicPr>
+            <a:picLocks noChangeAspect="1"/>
+          </p:cNvPicPr>
+          <p:nvPr/>
+        </p:nvPicPr>
+        <p:blipFill>
+          <a:blip r:embed="rId3"/>
+          <a:stretch>
+            <a:fillRect/>
+          </a:stretch>
+        </p:blipFill>
+        <p:spPr>
+          <a:xfrm>
+            <a:off x="1990253" y="1273924"/>
+            <a:ext cx="4915326" cy="5174428"/>
+          </a:xfrm>
+          <a:prstGeom prst="rect">
+            <a:avLst/>
+          </a:prstGeom>
+        </p:spPr>
+      </p:pic>
     </p:spTree>
     <p:extLst>
       <p:ext uri="{BB962C8B-B14F-4D97-AF65-F5344CB8AC3E}">
         <p14:creationId xmlns:p14="http://schemas.microsoft.com/office/powerpoint/2010/main" val="1228963046"/>
-      </p:ext>
-    </p:extLst>
-  </p:cSld>
-  <p:clrMapOvr>
-    <a:masterClrMapping/>
-  </p:clrMapOvr>
-</p:sld>
-</file>
-
-<file path=ppt/slides/slide19.xml><?xml version="1.0" encoding="utf-8"?>
-<p:sld xmlns:a="http://schemas.openxmlformats.org/drawingml/2006/main" xmlns:r="http://schemas.openxmlformats.org/officeDocument/2006/relationships" xmlns:p="http://schemas.openxmlformats.org/presentationml/2006/main">
-  <p:cSld>
-    <p:spTree>
-      <p:nvGrpSpPr>
-        <p:cNvPr id="1" name=""/>
-        <p:cNvGrpSpPr/>
-        <p:nvPr/>
-      </p:nvGrpSpPr>
-      <p:grpSpPr>
-        <a:xfrm>
-          <a:off x="0" y="0"/>
-          <a:ext cx="0" cy="0"/>
-          <a:chOff x="0" y="0"/>
-          <a:chExt cx="0" cy="0"/>
-        </a:xfrm>
-      </p:grpSpPr>
-      <p:sp>
-        <p:nvSpPr>
-          <p:cNvPr id="2" name="Title 1">
-            <a:extLst>
-              <a:ext uri="{FF2B5EF4-FFF2-40B4-BE49-F238E27FC236}">
-                <a16:creationId xmlns:a16="http://schemas.microsoft.com/office/drawing/2014/main" id="{2A6A7509-3510-E84E-9BC4-0A0EF04F28F8}"/>
-              </a:ext>
-            </a:extLst>
-          </p:cNvPr>
-          <p:cNvSpPr>
-            <a:spLocks noGrp="1"/>
-          </p:cNvSpPr>
-          <p:nvPr>
-            <p:ph type="title"/>
-          </p:nvPr>
-        </p:nvSpPr>
-        <p:spPr/>
-        <p:txBody>
-          <a:bodyPr/>
-          <a:lstStyle/>
-          <a:p>
-            <a:r>
-              <a:rPr lang="en-US" dirty="0"/>
-              <a:t>Appendix - Google Cloud</a:t>
-            </a:r>
-          </a:p>
-        </p:txBody>
-      </p:sp>
-      <p:sp>
-        <p:nvSpPr>
-          <p:cNvPr id="4" name="Content Placeholder 3">
-            <a:extLst>
-              <a:ext uri="{FF2B5EF4-FFF2-40B4-BE49-F238E27FC236}">
-                <a16:creationId xmlns:a16="http://schemas.microsoft.com/office/drawing/2014/main" id="{65A76E98-9216-4EED-8AB5-40415E214144}"/>
-              </a:ext>
-            </a:extLst>
-          </p:cNvPr>
-          <p:cNvSpPr>
-            <a:spLocks noGrp="1"/>
-          </p:cNvSpPr>
-          <p:nvPr>
-            <p:ph idx="1"/>
-          </p:nvPr>
-        </p:nvSpPr>
-        <p:spPr>
-          <a:xfrm>
-            <a:off x="2022437" y="1624405"/>
-            <a:ext cx="8799755" cy="4324574"/>
-          </a:xfrm>
-        </p:spPr>
-        <p:txBody>
-          <a:bodyPr>
-            <a:normAutofit/>
-          </a:bodyPr>
-          <a:lstStyle/>
-          <a:p>
-            <a:pPr lvl="1"/>
-            <a:endParaRPr lang="en-AU" dirty="0"/>
-          </a:p>
-          <a:p>
-            <a:pPr marL="457200" lvl="1" indent="0">
-              <a:buNone/>
-            </a:pPr>
-            <a:endParaRPr lang="en-AU" dirty="0"/>
-          </a:p>
-          <a:p>
-            <a:pPr lvl="1"/>
-            <a:endParaRPr lang="en-AU" dirty="0"/>
-          </a:p>
-        </p:txBody>
-      </p:sp>
-      <p:sp>
-        <p:nvSpPr>
-          <p:cNvPr id="5" name="Rectangle 2">
-            <a:extLst>
-              <a:ext uri="{FF2B5EF4-FFF2-40B4-BE49-F238E27FC236}">
-                <a16:creationId xmlns:a16="http://schemas.microsoft.com/office/drawing/2014/main" id="{02CB1686-ADE2-4020-A598-CE4D0762E7AE}"/>
-              </a:ext>
-            </a:extLst>
-          </p:cNvPr>
-          <p:cNvSpPr>
-            <a:spLocks noChangeArrowheads="1"/>
-          </p:cNvSpPr>
-          <p:nvPr/>
-        </p:nvSpPr>
-        <p:spPr bwMode="auto">
-          <a:xfrm>
-            <a:off x="2274450" y="1101187"/>
-            <a:ext cx="6816998" cy="1867113"/>
-          </a:xfrm>
-          <a:prstGeom prst="rect">
-            <a:avLst/>
-          </a:prstGeom>
-          <a:solidFill>
-            <a:srgbClr val="F7F7F7"/>
-          </a:solidFill>
-          <a:ln>
-            <a:noFill/>
-          </a:ln>
-          <a:effectLst/>
-          <a:extLst>
-            <a:ext uri="{91240B29-F687-4F45-9708-019B960494DF}">
-              <a14:hiddenLine xmlns:a14="http://schemas.microsoft.com/office/drawing/2010/main" w="9525">
-                <a:solidFill>
-                  <a:schemeClr val="tx1"/>
-                </a:solidFill>
-                <a:miter lim="800000"/>
-                <a:headEnd/>
-                <a:tailEnd/>
-              </a14:hiddenLine>
-            </a:ext>
-            <a:ext uri="{AF507438-7753-43E0-B8FC-AC1667EBCBE1}">
-              <a14:hiddenEffects xmlns:a14="http://schemas.microsoft.com/office/drawing/2010/main">
-                <a:effectLst>
-                  <a:outerShdw dist="35921" dir="2700000" algn="ctr" rotWithShape="0">
-                    <a:schemeClr val="bg2"/>
-                  </a:outerShdw>
-                </a:effectLst>
-              </a14:hiddenEffects>
-            </a:ext>
-          </a:extLst>
-        </p:spPr>
-        <p:txBody>
-          <a:bodyPr vert="horz" wrap="square" lIns="0" tIns="101568" rIns="0" bIns="101568" numCol="1" anchor="ctr" anchorCtr="0" compatLnSpc="1">
-            <a:prstTxWarp prst="textNoShape">
-              <a:avLst/>
-            </a:prstTxWarp>
-            <a:spAutoFit/>
-          </a:bodyPr>
-          <a:lstStyle/>
-          <a:p>
-            <a:pPr marL="0" marR="0" lvl="0" indent="0" algn="l" defTabSz="914400" rtl="0" eaLnBrk="0" fontAlgn="base" latinLnBrk="0" hangingPunct="0">
-              <a:lnSpc>
-                <a:spcPct val="100000"/>
-              </a:lnSpc>
-              <a:spcBef>
-                <a:spcPct val="0"/>
-              </a:spcBef>
-              <a:spcAft>
-                <a:spcPct val="0"/>
-              </a:spcAft>
-              <a:buClrTx/>
-              <a:buSzTx/>
-              <a:buFontTx/>
-              <a:buNone/>
-              <a:tabLst/>
-            </a:pPr>
-            <a:r>
-              <a:rPr lang="en-US" altLang="en-US" dirty="0" err="1">
-                <a:latin typeface="Arial" panose="020B0604020202020204" pitchFamily="34" charset="0"/>
-              </a:rPr>
-              <a:t>g</a:t>
-            </a:r>
-            <a:r>
-              <a:rPr kumimoji="0" lang="en-US" altLang="en-US" sz="1800" b="0" i="0" u="none" strike="noStrike" cap="none" normalizeH="0" baseline="0" dirty="0" err="1">
-                <a:ln>
-                  <a:noFill/>
-                </a:ln>
-                <a:solidFill>
-                  <a:schemeClr val="tx1"/>
-                </a:solidFill>
-                <a:effectLst/>
-                <a:latin typeface="Arial" panose="020B0604020202020204" pitchFamily="34" charset="0"/>
-              </a:rPr>
-              <a:t>cloud</a:t>
-            </a:r>
-            <a:r>
-              <a:rPr kumimoji="0" lang="en-US" altLang="en-US" sz="1800" b="0" i="0" u="none" strike="noStrike" cap="none" normalizeH="0" baseline="0" dirty="0">
-                <a:ln>
-                  <a:noFill/>
-                </a:ln>
-                <a:solidFill>
-                  <a:schemeClr val="tx1"/>
-                </a:solidFill>
-                <a:effectLst/>
-                <a:latin typeface="Arial" panose="020B0604020202020204" pitchFamily="34" charset="0"/>
-              </a:rPr>
-              <a:t> components install app-engine-java</a:t>
-            </a:r>
-          </a:p>
-          <a:p>
-            <a:pPr marL="0" marR="0" lvl="0" indent="0" algn="l" defTabSz="914400" rtl="0" eaLnBrk="0" fontAlgn="base" latinLnBrk="0" hangingPunct="0">
-              <a:lnSpc>
-                <a:spcPct val="100000"/>
-              </a:lnSpc>
-              <a:spcBef>
-                <a:spcPct val="0"/>
-              </a:spcBef>
-              <a:spcAft>
-                <a:spcPct val="0"/>
-              </a:spcAft>
-              <a:buClrTx/>
-              <a:buSzTx/>
-              <a:buFontTx/>
-              <a:buNone/>
-              <a:tabLst/>
-            </a:pPr>
-            <a:r>
-              <a:rPr kumimoji="0" lang="en-US" altLang="en-US" sz="1800" b="0" i="0" u="none" strike="noStrike" cap="none" normalizeH="0" baseline="0" dirty="0" err="1">
-                <a:ln>
-                  <a:noFill/>
-                </a:ln>
-                <a:solidFill>
-                  <a:schemeClr val="tx1"/>
-                </a:solidFill>
-                <a:effectLst/>
-                <a:latin typeface="Arial" panose="020B0604020202020204" pitchFamily="34" charset="0"/>
-              </a:rPr>
-              <a:t>gcloud</a:t>
-            </a:r>
-            <a:r>
-              <a:rPr kumimoji="0" lang="en-US" altLang="en-US" sz="1800" b="0" i="0" u="none" strike="noStrike" cap="none" normalizeH="0" baseline="0" dirty="0">
-                <a:ln>
-                  <a:noFill/>
-                </a:ln>
-                <a:solidFill>
-                  <a:schemeClr val="tx1"/>
-                </a:solidFill>
-                <a:effectLst/>
-                <a:latin typeface="Arial" panose="020B0604020202020204" pitchFamily="34" charset="0"/>
-              </a:rPr>
-              <a:t> config set proxy/type http</a:t>
-            </a:r>
-          </a:p>
-          <a:p>
-            <a:pPr marL="0" marR="0" lvl="0" indent="0" algn="l" defTabSz="914400" rtl="0" eaLnBrk="0" fontAlgn="base" latinLnBrk="0" hangingPunct="0">
-              <a:lnSpc>
-                <a:spcPct val="100000"/>
-              </a:lnSpc>
-              <a:spcBef>
-                <a:spcPct val="0"/>
-              </a:spcBef>
-              <a:spcAft>
-                <a:spcPct val="0"/>
-              </a:spcAft>
-              <a:buClrTx/>
-              <a:buSzTx/>
-              <a:buFontTx/>
-              <a:buNone/>
-              <a:tabLst/>
-            </a:pPr>
-            <a:r>
-              <a:rPr lang="en-US" altLang="en-US" dirty="0" err="1">
-                <a:latin typeface="Arial" panose="020B0604020202020204" pitchFamily="34" charset="0"/>
-              </a:rPr>
-              <a:t>gcloud</a:t>
-            </a:r>
-            <a:r>
-              <a:rPr lang="en-US" altLang="en-US" dirty="0">
-                <a:latin typeface="Arial" panose="020B0604020202020204" pitchFamily="34" charset="0"/>
-              </a:rPr>
-              <a:t> config set </a:t>
-            </a:r>
-            <a:r>
-              <a:rPr lang="en-US" altLang="en-US" dirty="0" err="1">
-                <a:latin typeface="Arial" panose="020B0604020202020204" pitchFamily="34" charset="0"/>
-              </a:rPr>
-              <a:t>proxyaddress</a:t>
-            </a:r>
-            <a:r>
-              <a:rPr lang="en-US" altLang="en-US" dirty="0">
-                <a:latin typeface="Arial" panose="020B0604020202020204" pitchFamily="34" charset="0"/>
-              </a:rPr>
-              <a:t> </a:t>
-            </a:r>
-            <a:r>
-              <a:rPr lang="en-US" altLang="en-US" dirty="0" err="1">
-                <a:latin typeface="Arial" panose="020B0604020202020204" pitchFamily="34" charset="0"/>
-              </a:rPr>
-              <a:t>eisproxyns</a:t>
-            </a:r>
-            <a:endParaRPr lang="en-US" altLang="en-US" dirty="0">
-              <a:latin typeface="Arial" panose="020B0604020202020204" pitchFamily="34" charset="0"/>
-            </a:endParaRPr>
-          </a:p>
-          <a:p>
-            <a:pPr marL="0" marR="0" lvl="0" indent="0" algn="l" defTabSz="914400" rtl="0" eaLnBrk="0" fontAlgn="base" latinLnBrk="0" hangingPunct="0">
-              <a:lnSpc>
-                <a:spcPct val="100000"/>
-              </a:lnSpc>
-              <a:spcBef>
-                <a:spcPct val="0"/>
-              </a:spcBef>
-              <a:spcAft>
-                <a:spcPct val="0"/>
-              </a:spcAft>
-              <a:buClrTx/>
-              <a:buSzTx/>
-              <a:buFontTx/>
-              <a:buNone/>
-              <a:tabLst/>
-            </a:pPr>
-            <a:r>
-              <a:rPr lang="en-US" altLang="en-US" dirty="0" err="1">
-                <a:latin typeface="Arial" panose="020B0604020202020204" pitchFamily="34" charset="0"/>
-              </a:rPr>
-              <a:t>g</a:t>
-            </a:r>
-            <a:r>
-              <a:rPr kumimoji="0" lang="en-US" altLang="en-US" sz="1800" b="0" i="0" u="none" strike="noStrike" cap="none" normalizeH="0" baseline="0" dirty="0" err="1">
-                <a:ln>
-                  <a:noFill/>
-                </a:ln>
-                <a:solidFill>
-                  <a:schemeClr val="tx1"/>
-                </a:solidFill>
-                <a:effectLst/>
-                <a:latin typeface="Arial" panose="020B0604020202020204" pitchFamily="34" charset="0"/>
-              </a:rPr>
-              <a:t>cloud</a:t>
-            </a:r>
-            <a:r>
-              <a:rPr kumimoji="0" lang="en-US" altLang="en-US" sz="1800" b="0" i="0" u="none" strike="noStrike" cap="none" normalizeH="0" baseline="0" dirty="0">
-                <a:ln>
-                  <a:noFill/>
-                </a:ln>
-                <a:solidFill>
-                  <a:schemeClr val="tx1"/>
-                </a:solidFill>
-                <a:effectLst/>
-                <a:latin typeface="Arial" panose="020B0604020202020204" pitchFamily="34" charset="0"/>
-              </a:rPr>
-              <a:t> config set proxy/port 8080</a:t>
-            </a:r>
-          </a:p>
-          <a:p>
-            <a:pPr marL="0" marR="0" lvl="0" indent="0" algn="l" defTabSz="914400" rtl="0" eaLnBrk="0" fontAlgn="base" latinLnBrk="0" hangingPunct="0">
-              <a:lnSpc>
-                <a:spcPct val="100000"/>
-              </a:lnSpc>
-              <a:spcBef>
-                <a:spcPct val="0"/>
-              </a:spcBef>
-              <a:spcAft>
-                <a:spcPct val="0"/>
-              </a:spcAft>
-              <a:buClrTx/>
-              <a:buSzTx/>
-              <a:buFontTx/>
-              <a:buNone/>
-              <a:tabLst/>
-            </a:pPr>
-            <a:endParaRPr lang="en-US" altLang="en-US" dirty="0">
-              <a:latin typeface="Arial" panose="020B0604020202020204" pitchFamily="34" charset="0"/>
-            </a:endParaRPr>
-          </a:p>
-          <a:p>
-            <a:pPr lvl="0" defTabSz="914400" eaLnBrk="0" fontAlgn="base" hangingPunct="0">
-              <a:spcBef>
-                <a:spcPct val="0"/>
-              </a:spcBef>
-              <a:spcAft>
-                <a:spcPct val="0"/>
-              </a:spcAft>
-            </a:pPr>
-            <a:r>
-              <a:rPr lang="en-US" altLang="en-US" dirty="0" err="1">
-                <a:latin typeface="Arial" panose="020B0604020202020204" pitchFamily="34" charset="0"/>
-              </a:rPr>
-              <a:t>gcloud</a:t>
-            </a:r>
-            <a:r>
-              <a:rPr lang="en-US" altLang="en-US" dirty="0">
-                <a:latin typeface="Arial" panose="020B0604020202020204" pitchFamily="34" charset="0"/>
-              </a:rPr>
-              <a:t> config set core/</a:t>
-            </a:r>
-            <a:r>
-              <a:rPr lang="en-US" altLang="en-US" dirty="0" err="1">
-                <a:latin typeface="Arial" panose="020B0604020202020204" pitchFamily="34" charset="0"/>
-              </a:rPr>
-              <a:t>custom_ca_certs_file</a:t>
-            </a:r>
-            <a:r>
-              <a:rPr lang="en-US" altLang="en-US" dirty="0">
-                <a:latin typeface="Arial" panose="020B0604020202020204" pitchFamily="34" charset="0"/>
-              </a:rPr>
-              <a:t> /path/to/</a:t>
-            </a:r>
-            <a:r>
-              <a:rPr lang="en-US" altLang="en-US" dirty="0" err="1">
-                <a:latin typeface="Arial" panose="020B0604020202020204" pitchFamily="34" charset="0"/>
-              </a:rPr>
-              <a:t>ca_certs</a:t>
-            </a:r>
-            <a:endParaRPr kumimoji="0" lang="en-US" altLang="en-US" sz="1800" b="0" i="0" u="none" strike="noStrike" cap="none" normalizeH="0" baseline="0" dirty="0">
-              <a:ln>
-                <a:noFill/>
-              </a:ln>
-              <a:solidFill>
-                <a:schemeClr val="tx1"/>
-              </a:solidFill>
-              <a:effectLst/>
-              <a:latin typeface="Arial" panose="020B0604020202020204" pitchFamily="34" charset="0"/>
-            </a:endParaRPr>
-          </a:p>
-        </p:txBody>
-      </p:sp>
-    </p:spTree>
-    <p:extLst>
-      <p:ext uri="{BB962C8B-B14F-4D97-AF65-F5344CB8AC3E}">
-        <p14:creationId xmlns:p14="http://schemas.microsoft.com/office/powerpoint/2010/main" val="2286473323"/>
       </p:ext>
     </p:extLst>
   </p:cSld>

</xml_diff>